<commit_message>
ReadMe how to run application
</commit_message>
<xml_diff>
--- a/report/TSP_Report.pptx
+++ b/report/TSP_Report.pptx
@@ -18,6 +18,7 @@
     <p:sldId id="266" r:id="rId12"/>
     <p:sldId id="267" r:id="rId13"/>
     <p:sldId id="260" r:id="rId14"/>
+    <p:sldId id="269" r:id="rId15"/>
   </p:sldIdLst>
   <p:sldSz cx="12192000" cy="6858000"/>
   <p:notesSz cx="6858000" cy="9144000"/>
@@ -4506,7 +4507,7 @@
         </p:spPr>
         <p:txBody>
           <a:bodyPr>
-            <a:normAutofit fontScale="92500" lnSpcReduction="10000"/>
+            <a:normAutofit/>
           </a:bodyPr>
           <a:lstStyle/>
           <a:p>
@@ -4543,7 +4544,7 @@
             </a:r>
           </a:p>
           <a:p>
-            <a:pPr marL="0" indent="0">
+            <a:pPr marL="274320" lvl="1" indent="0">
               <a:buNone/>
             </a:pPr>
             <a:r>
@@ -4552,7 +4553,7 @@
             </a:r>
           </a:p>
           <a:p>
-            <a:pPr marL="0" indent="0">
+            <a:pPr marL="274320" lvl="1" indent="0">
               <a:buNone/>
             </a:pPr>
             <a:r>
@@ -4561,7 +4562,7 @@
             </a:r>
           </a:p>
           <a:p>
-            <a:pPr marL="0" indent="0">
+            <a:pPr marL="274320" lvl="1" indent="0">
               <a:buNone/>
             </a:pPr>
             <a:r>
@@ -4570,7 +4571,7 @@
             </a:r>
           </a:p>
           <a:p>
-            <a:pPr marL="0" indent="0">
+            <a:pPr marL="274320" lvl="1" indent="0">
               <a:buNone/>
             </a:pPr>
             <a:r>
@@ -4579,7 +4580,7 @@
             </a:r>
           </a:p>
           <a:p>
-            <a:pPr marL="0" indent="0">
+            <a:pPr marL="274320" lvl="1" indent="0">
               <a:buNone/>
             </a:pPr>
             <a:r>
@@ -4588,7 +4589,7 @@
             </a:r>
           </a:p>
           <a:p>
-            <a:pPr marL="0" indent="0">
+            <a:pPr marL="274320" lvl="1" indent="0">
               <a:buNone/>
             </a:pPr>
             <a:r>
@@ -4605,7 +4606,7 @@
             </a:r>
           </a:p>
           <a:p>
-            <a:pPr marL="0" indent="0">
+            <a:pPr marL="274320" lvl="1" indent="0">
               <a:buNone/>
             </a:pPr>
             <a:r>
@@ -4625,6 +4626,126 @@
     <p:extLst>
       <p:ext uri="{BB962C8B-B14F-4D97-AF65-F5344CB8AC3E}">
         <p14:creationId xmlns:p14="http://schemas.microsoft.com/office/powerpoint/2010/main" val="1349963762"/>
+      </p:ext>
+    </p:extLst>
+  </p:cSld>
+  <p:clrMapOvr>
+    <a:masterClrMapping/>
+  </p:clrMapOvr>
+</p:sld>
+</file>
+
+<file path=ppt/slides/slide14.xml><?xml version="1.0" encoding="utf-8"?>
+<p:sld xmlns:a="http://schemas.openxmlformats.org/drawingml/2006/main" xmlns:r="http://schemas.openxmlformats.org/officeDocument/2006/relationships" xmlns:p="http://schemas.openxmlformats.org/presentationml/2006/main">
+  <p:cSld>
+    <p:spTree>
+      <p:nvGrpSpPr>
+        <p:cNvPr id="1" name=""/>
+        <p:cNvGrpSpPr/>
+        <p:nvPr/>
+      </p:nvGrpSpPr>
+      <p:grpSpPr>
+        <a:xfrm>
+          <a:off x="0" y="0"/>
+          <a:ext cx="0" cy="0"/>
+          <a:chOff x="0" y="0"/>
+          <a:chExt cx="0" cy="0"/>
+        </a:xfrm>
+      </p:grpSpPr>
+      <p:sp>
+        <p:nvSpPr>
+          <p:cNvPr id="2" name="Title 1">
+            <a:extLst>
+              <a:ext uri="{FF2B5EF4-FFF2-40B4-BE49-F238E27FC236}">
+                <a16:creationId xmlns:a16="http://schemas.microsoft.com/office/drawing/2014/main" id="{2F711939-5A51-46E6-BD0D-60E374119FA1}"/>
+              </a:ext>
+            </a:extLst>
+          </p:cNvPr>
+          <p:cNvSpPr>
+            <a:spLocks noGrp="1"/>
+          </p:cNvSpPr>
+          <p:nvPr>
+            <p:ph type="title"/>
+          </p:nvPr>
+        </p:nvSpPr>
+        <p:spPr/>
+        <p:txBody>
+          <a:bodyPr/>
+          <a:lstStyle/>
+          <a:p>
+            <a:r>
+              <a:rPr lang="en-US" dirty="0"/>
+              <a:t>Running the Application</a:t>
+            </a:r>
+          </a:p>
+        </p:txBody>
+      </p:sp>
+      <p:sp>
+        <p:nvSpPr>
+          <p:cNvPr id="3" name="Content Placeholder 2">
+            <a:extLst>
+              <a:ext uri="{FF2B5EF4-FFF2-40B4-BE49-F238E27FC236}">
+                <a16:creationId xmlns:a16="http://schemas.microsoft.com/office/drawing/2014/main" id="{17A83F68-3B7A-4FD3-B322-1CE456FA16BF}"/>
+              </a:ext>
+            </a:extLst>
+          </p:cNvPr>
+          <p:cNvSpPr>
+            <a:spLocks noGrp="1"/>
+          </p:cNvSpPr>
+          <p:nvPr>
+            <p:ph idx="1"/>
+          </p:nvPr>
+        </p:nvSpPr>
+        <p:spPr/>
+        <p:txBody>
+          <a:bodyPr/>
+          <a:lstStyle/>
+          <a:p>
+            <a:r>
+              <a:rPr lang="en-US" dirty="0"/>
+              <a:t>Download the source code from :</a:t>
+            </a:r>
+          </a:p>
+          <a:p>
+            <a:r>
+              <a:rPr lang="en-US" dirty="0"/>
+              <a:t>https://github.com/bhanushaliv/INFO6205_536</a:t>
+            </a:r>
+          </a:p>
+          <a:p>
+            <a:endParaRPr lang="en-US" dirty="0"/>
+          </a:p>
+          <a:p>
+            <a:r>
+              <a:rPr lang="en-US" dirty="0" err="1"/>
+              <a:t>mvn</a:t>
+            </a:r>
+            <a:r>
+              <a:rPr lang="en-US" dirty="0"/>
+              <a:t> clean install (Have Maven and Java preinstalled)</a:t>
+            </a:r>
+          </a:p>
+          <a:p>
+            <a:r>
+              <a:rPr lang="en-US" dirty="0"/>
+              <a:t>After successfully running unit test cases and maven build </a:t>
+            </a:r>
+          </a:p>
+          <a:p>
+            <a:endParaRPr lang="en-US" dirty="0"/>
+          </a:p>
+          <a:p>
+            <a:r>
+              <a:rPr lang="en-US" dirty="0"/>
+              <a:t>java –jar ./target/final-project-1.0-SNAPSHOT.jar</a:t>
+            </a:r>
+          </a:p>
+        </p:txBody>
+      </p:sp>
+    </p:spTree>
+    <p:extLst>
+      <p:ext uri="{BB962C8B-B14F-4D97-AF65-F5344CB8AC3E}">
+        <p14:creationId xmlns:p14="http://schemas.microsoft.com/office/powerpoint/2010/main" val="2122344968"/>
       </p:ext>
     </p:extLst>
   </p:cSld>

</xml_diff>